<commit_message>
Added contents; introduced a video.
</commit_message>
<xml_diff>
--- a/Maogai_final.d/PowerPoint/改革配套与持续发展的路径.pptx
+++ b/Maogai_final.d/PowerPoint/改革配套与持续发展的路径.pptx
@@ -104,6 +104,11 @@
       </a:defRPr>
     </a:lvl9pPr>
   </p:defaultTextStyle>
+  <p:extLst>
+    <p:ext uri="{EFAFB233-063F-42B5-8137-9DF3F51BA10A}">
+      <p15:sldGuideLst xmlns:p15="http://schemas.microsoft.com/office/powerpoint/2012/main"/>
+    </p:ext>
+  </p:extLst>
 </p:presentation>
 </file>
 
@@ -254,7 +259,7 @@
           <a:p>
             <a:fld id="{826895A2-B63F-4D10-B7FE-D44C4218FD29}" type="datetimeFigureOut">
               <a:rPr lang="en-US" smtClean="0"/>
-              <a:t>2025-12-14</a:t>
+              <a:t>2025-12-18</a:t>
             </a:fld>
             <a:endParaRPr lang="en-US"/>
           </a:p>
@@ -452,7 +457,7 @@
           <a:p>
             <a:fld id="{826895A2-B63F-4D10-B7FE-D44C4218FD29}" type="datetimeFigureOut">
               <a:rPr lang="en-US" smtClean="0"/>
-              <a:t>2025-12-14</a:t>
+              <a:t>2025-12-18</a:t>
             </a:fld>
             <a:endParaRPr lang="en-US"/>
           </a:p>
@@ -660,7 +665,7 @@
           <a:p>
             <a:fld id="{826895A2-B63F-4D10-B7FE-D44C4218FD29}" type="datetimeFigureOut">
               <a:rPr lang="en-US" smtClean="0"/>
-              <a:t>2025-12-14</a:t>
+              <a:t>2025-12-18</a:t>
             </a:fld>
             <a:endParaRPr lang="en-US"/>
           </a:p>
@@ -858,7 +863,7 @@
           <a:p>
             <a:fld id="{826895A2-B63F-4D10-B7FE-D44C4218FD29}" type="datetimeFigureOut">
               <a:rPr lang="en-US" smtClean="0"/>
-              <a:t>2025-12-14</a:t>
+              <a:t>2025-12-18</a:t>
             </a:fld>
             <a:endParaRPr lang="en-US"/>
           </a:p>
@@ -1133,7 +1138,7 @@
           <a:p>
             <a:fld id="{826895A2-B63F-4D10-B7FE-D44C4218FD29}" type="datetimeFigureOut">
               <a:rPr lang="en-US" smtClean="0"/>
-              <a:t>2025-12-14</a:t>
+              <a:t>2025-12-18</a:t>
             </a:fld>
             <a:endParaRPr lang="en-US"/>
           </a:p>
@@ -1398,7 +1403,7 @@
           <a:p>
             <a:fld id="{826895A2-B63F-4D10-B7FE-D44C4218FD29}" type="datetimeFigureOut">
               <a:rPr lang="en-US" smtClean="0"/>
-              <a:t>2025-12-14</a:t>
+              <a:t>2025-12-18</a:t>
             </a:fld>
             <a:endParaRPr lang="en-US"/>
           </a:p>
@@ -1810,7 +1815,7 @@
           <a:p>
             <a:fld id="{826895A2-B63F-4D10-B7FE-D44C4218FD29}" type="datetimeFigureOut">
               <a:rPr lang="en-US" smtClean="0"/>
-              <a:t>2025-12-14</a:t>
+              <a:t>2025-12-18</a:t>
             </a:fld>
             <a:endParaRPr lang="en-US"/>
           </a:p>
@@ -1951,7 +1956,7 @@
           <a:p>
             <a:fld id="{826895A2-B63F-4D10-B7FE-D44C4218FD29}" type="datetimeFigureOut">
               <a:rPr lang="en-US" smtClean="0"/>
-              <a:t>2025-12-14</a:t>
+              <a:t>2025-12-18</a:t>
             </a:fld>
             <a:endParaRPr lang="en-US"/>
           </a:p>
@@ -2064,7 +2069,7 @@
           <a:p>
             <a:fld id="{826895A2-B63F-4D10-B7FE-D44C4218FD29}" type="datetimeFigureOut">
               <a:rPr lang="en-US" smtClean="0"/>
-              <a:t>2025-12-14</a:t>
+              <a:t>2025-12-18</a:t>
             </a:fld>
             <a:endParaRPr lang="en-US"/>
           </a:p>
@@ -2375,7 +2380,7 @@
           <a:p>
             <a:fld id="{826895A2-B63F-4D10-B7FE-D44C4218FD29}" type="datetimeFigureOut">
               <a:rPr lang="en-US" smtClean="0"/>
-              <a:t>2025-12-14</a:t>
+              <a:t>2025-12-18</a:t>
             </a:fld>
             <a:endParaRPr lang="en-US"/>
           </a:p>
@@ -2663,7 +2668,7 @@
           <a:p>
             <a:fld id="{826895A2-B63F-4D10-B7FE-D44C4218FD29}" type="datetimeFigureOut">
               <a:rPr lang="en-US" smtClean="0"/>
-              <a:t>2025-12-14</a:t>
+              <a:t>2025-12-18</a:t>
             </a:fld>
             <a:endParaRPr lang="en-US"/>
           </a:p>
@@ -2904,7 +2909,7 @@
           <a:p>
             <a:fld id="{826895A2-B63F-4D10-B7FE-D44C4218FD29}" type="datetimeFigureOut">
               <a:rPr lang="en-US" smtClean="0"/>
-              <a:t>2025-12-14</a:t>
+              <a:t>2025-12-18</a:t>
             </a:fld>
             <a:endParaRPr lang="en-US"/>
           </a:p>
@@ -3375,8 +3380,8 @@
         </p:nvSpPr>
         <p:spPr>
           <a:xfrm>
-            <a:off x="2534816" y="494723"/>
-            <a:ext cx="7122368" cy="1077218"/>
+            <a:off x="2534816" y="479333"/>
+            <a:ext cx="7122368" cy="1092607"/>
           </a:xfrm>
           <a:prstGeom prst="rect">
             <a:avLst/>
@@ -3395,7 +3400,7 @@
               </a:spcBef>
             </a:pPr>
             <a:r>
-              <a:rPr lang="zh-CN" altLang="en-US" b="1" dirty="0">
+              <a:rPr lang="zh-CN" altLang="en-US" sz="2400" b="1" dirty="0">
                 <a:latin typeface="Noto Serif CJK SC" panose="02020200000000000000" pitchFamily="18" charset="-128"/>
                 <a:ea typeface="Noto Serif CJK SC" panose="02020200000000000000" pitchFamily="18" charset="-128"/>
               </a:rPr>
@@ -3415,17 +3420,12 @@
               </a:rPr>
               <a:t>国内：第七章中揭示的各类深层问题待破解；</a:t>
             </a:r>
-            <a:endParaRPr lang="en-US" altLang="zh-CN" dirty="0">
-              <a:latin typeface="Noto Serif CJK SC" panose="02020200000000000000" pitchFamily="18" charset="-128"/>
-              <a:ea typeface="Noto Serif CJK SC" panose="02020200000000000000" pitchFamily="18" charset="-128"/>
-            </a:endParaRPr>
-          </a:p>
-          <a:p>
-            <a:pPr>
-              <a:spcBef>
-                <a:spcPts val="600"/>
-              </a:spcBef>
-            </a:pPr>
+            <a:br>
+              <a:rPr lang="en-US" altLang="zh-CN" dirty="0">
+                <a:latin typeface="Noto Serif CJK SC" panose="02020200000000000000" pitchFamily="18" charset="-128"/>
+                <a:ea typeface="Noto Serif CJK SC" panose="02020200000000000000" pitchFamily="18" charset="-128"/>
+              </a:rPr>
+            </a:br>
             <a:r>
               <a:rPr lang="zh-CN" altLang="en-US" dirty="0">
                 <a:latin typeface="Noto Serif CJK SC" panose="02020200000000000000" pitchFamily="18" charset="-128"/>

</xml_diff>